<commit_message>
Added assortativity to info 2012
</commit_message>
<xml_diff>
--- a/presentation/kcore-kdense.pptx
+++ b/presentation/kcore-kdense.pptx
@@ -228,11 +228,11 @@
           <c:showBubbleSize val="0"/>
         </c:dLbls>
         <c:gapWidth val="150"/>
-        <c:axId val="2076288616"/>
-        <c:axId val="2097815256"/>
+        <c:axId val="2097453960"/>
+        <c:axId val="2097457064"/>
       </c:barChart>
       <c:catAx>
-        <c:axId val="2076288616"/>
+        <c:axId val="2097453960"/>
         <c:scaling>
           <c:orientation val="minMax"/>
         </c:scaling>
@@ -242,7 +242,7 @@
         <c:majorTickMark val="out"/>
         <c:minorTickMark val="none"/>
         <c:tickLblPos val="nextTo"/>
-        <c:crossAx val="2097815256"/>
+        <c:crossAx val="2097457064"/>
         <c:crosses val="autoZero"/>
         <c:auto val="1"/>
         <c:lblAlgn val="ctr"/>
@@ -250,7 +250,7 @@
         <c:noMultiLvlLbl val="0"/>
       </c:catAx>
       <c:valAx>
-        <c:axId val="2097815256"/>
+        <c:axId val="2097457064"/>
         <c:scaling>
           <c:orientation val="minMax"/>
         </c:scaling>
@@ -261,7 +261,7 @@
         <c:majorTickMark val="out"/>
         <c:minorTickMark val="none"/>
         <c:tickLblPos val="nextTo"/>
-        <c:crossAx val="2076288616"/>
+        <c:crossAx val="2097453960"/>
         <c:crosses val="autoZero"/>
         <c:crossBetween val="between"/>
       </c:valAx>
@@ -817,11 +817,11 @@
           <c:showBubbleSize val="0"/>
         </c:dLbls>
         <c:gapWidth val="150"/>
-        <c:axId val="2067264632"/>
-        <c:axId val="2122586552"/>
+        <c:axId val="2097574792"/>
+        <c:axId val="2097580536"/>
       </c:barChart>
       <c:catAx>
-        <c:axId val="2067264632"/>
+        <c:axId val="2097574792"/>
         <c:scaling>
           <c:orientation val="minMax"/>
         </c:scaling>
@@ -856,7 +856,7 @@
         <c:majorTickMark val="out"/>
         <c:minorTickMark val="none"/>
         <c:tickLblPos val="nextTo"/>
-        <c:crossAx val="2122586552"/>
+        <c:crossAx val="2097580536"/>
         <c:crosses val="autoZero"/>
         <c:auto val="1"/>
         <c:lblAlgn val="ctr"/>
@@ -864,7 +864,7 @@
         <c:noMultiLvlLbl val="0"/>
       </c:catAx>
       <c:valAx>
-        <c:axId val="2122586552"/>
+        <c:axId val="2097580536"/>
         <c:scaling>
           <c:orientation val="minMax"/>
         </c:scaling>
@@ -875,7 +875,7 @@
         <c:majorTickMark val="out"/>
         <c:minorTickMark val="none"/>
         <c:tickLblPos val="nextTo"/>
-        <c:crossAx val="2067264632"/>
+        <c:crossAx val="2097574792"/>
         <c:crosses val="autoZero"/>
         <c:crossBetween val="between"/>
       </c:valAx>
@@ -1474,11 +1474,11 @@
         </c:dLbls>
         <c:marker val="1"/>
         <c:smooth val="0"/>
-        <c:axId val="2098018936"/>
-        <c:axId val="2097516056"/>
+        <c:axId val="2097613832"/>
+        <c:axId val="2097616808"/>
       </c:lineChart>
       <c:catAx>
-        <c:axId val="2098018936"/>
+        <c:axId val="2097613832"/>
         <c:scaling>
           <c:orientation val="minMax"/>
         </c:scaling>
@@ -1487,7 +1487,7 @@
         <c:majorTickMark val="out"/>
         <c:minorTickMark val="none"/>
         <c:tickLblPos val="nextTo"/>
-        <c:crossAx val="2097516056"/>
+        <c:crossAx val="2097616808"/>
         <c:crosses val="autoZero"/>
         <c:auto val="1"/>
         <c:lblAlgn val="ctr"/>
@@ -1496,7 +1496,7 @@
         <c:noMultiLvlLbl val="0"/>
       </c:catAx>
       <c:valAx>
-        <c:axId val="2097516056"/>
+        <c:axId val="2097616808"/>
         <c:scaling>
           <c:orientation val="minMax"/>
         </c:scaling>
@@ -1507,7 +1507,7 @@
         <c:majorTickMark val="out"/>
         <c:minorTickMark val="none"/>
         <c:tickLblPos val="nextTo"/>
-        <c:crossAx val="2098018936"/>
+        <c:crossAx val="2097613832"/>
         <c:crosses val="autoZero"/>
         <c:crossBetween val="between"/>
       </c:valAx>
@@ -1710,11 +1710,11 @@
           <c:showBubbleSize val="0"/>
         </c:dLbls>
         <c:gapWidth val="150"/>
-        <c:axId val="2102030744"/>
-        <c:axId val="2069722328"/>
+        <c:axId val="2097725704"/>
+        <c:axId val="2097728680"/>
       </c:barChart>
       <c:catAx>
-        <c:axId val="2102030744"/>
+        <c:axId val="2097725704"/>
         <c:scaling>
           <c:orientation val="minMax"/>
         </c:scaling>
@@ -1723,7 +1723,7 @@
         <c:majorTickMark val="out"/>
         <c:minorTickMark val="none"/>
         <c:tickLblPos val="nextTo"/>
-        <c:crossAx val="2069722328"/>
+        <c:crossAx val="2097728680"/>
         <c:crosses val="autoZero"/>
         <c:auto val="1"/>
         <c:lblAlgn val="ctr"/>
@@ -1731,7 +1731,7 @@
         <c:noMultiLvlLbl val="0"/>
       </c:catAx>
       <c:valAx>
-        <c:axId val="2069722328"/>
+        <c:axId val="2097728680"/>
         <c:scaling>
           <c:orientation val="minMax"/>
         </c:scaling>
@@ -1742,7 +1742,7 @@
         <c:majorTickMark val="out"/>
         <c:minorTickMark val="none"/>
         <c:tickLblPos val="nextTo"/>
-        <c:crossAx val="2102030744"/>
+        <c:crossAx val="2097725704"/>
         <c:crosses val="autoZero"/>
         <c:crossBetween val="between"/>
       </c:valAx>
@@ -1851,11 +1851,11 @@
           <c:showBubbleSize val="0"/>
         </c:dLbls>
         <c:gapWidth val="150"/>
-        <c:axId val="2102162184"/>
-        <c:axId val="2122783272"/>
+        <c:axId val="2097752504"/>
+        <c:axId val="2097755480"/>
       </c:barChart>
       <c:catAx>
-        <c:axId val="2102162184"/>
+        <c:axId val="2097752504"/>
         <c:scaling>
           <c:orientation val="minMax"/>
         </c:scaling>
@@ -1864,7 +1864,7 @@
         <c:majorTickMark val="out"/>
         <c:minorTickMark val="none"/>
         <c:tickLblPos val="nextTo"/>
-        <c:crossAx val="2122783272"/>
+        <c:crossAx val="2097755480"/>
         <c:crosses val="autoZero"/>
         <c:auto val="1"/>
         <c:lblAlgn val="ctr"/>
@@ -1872,7 +1872,7 @@
         <c:noMultiLvlLbl val="0"/>
       </c:catAx>
       <c:valAx>
-        <c:axId val="2122783272"/>
+        <c:axId val="2097755480"/>
         <c:scaling>
           <c:orientation val="minMax"/>
         </c:scaling>
@@ -1883,7 +1883,7 @@
         <c:majorTickMark val="out"/>
         <c:minorTickMark val="none"/>
         <c:tickLblPos val="nextTo"/>
-        <c:crossAx val="2102162184"/>
+        <c:crossAx val="2097752504"/>
         <c:crosses val="autoZero"/>
         <c:crossBetween val="between"/>
       </c:valAx>
@@ -2051,11 +2051,11 @@
           <c:showBubbleSize val="0"/>
         </c:dLbls>
         <c:gapWidth val="150"/>
-        <c:axId val="2101455576"/>
-        <c:axId val="2101486568"/>
+        <c:axId val="2092555736"/>
+        <c:axId val="2092558712"/>
       </c:barChart>
       <c:catAx>
-        <c:axId val="2101455576"/>
+        <c:axId val="2092555736"/>
         <c:scaling>
           <c:orientation val="minMax"/>
         </c:scaling>
@@ -2064,7 +2064,7 @@
         <c:majorTickMark val="out"/>
         <c:minorTickMark val="none"/>
         <c:tickLblPos val="nextTo"/>
-        <c:crossAx val="2101486568"/>
+        <c:crossAx val="2092558712"/>
         <c:crosses val="autoZero"/>
         <c:auto val="1"/>
         <c:lblAlgn val="ctr"/>
@@ -2072,7 +2072,7 @@
         <c:noMultiLvlLbl val="0"/>
       </c:catAx>
       <c:valAx>
-        <c:axId val="2101486568"/>
+        <c:axId val="2092558712"/>
         <c:scaling>
           <c:orientation val="minMax"/>
         </c:scaling>
@@ -2083,7 +2083,7 @@
         <c:majorTickMark val="out"/>
         <c:minorTickMark val="none"/>
         <c:tickLblPos val="nextTo"/>
-        <c:crossAx val="2101455576"/>
+        <c:crossAx val="2092555736"/>
         <c:crosses val="autoZero"/>
         <c:crossBetween val="between"/>
       </c:valAx>
@@ -2251,11 +2251,11 @@
           <c:showBubbleSize val="0"/>
         </c:dLbls>
         <c:gapWidth val="150"/>
-        <c:axId val="2123948184"/>
-        <c:axId val="2123527784"/>
+        <c:axId val="2092596904"/>
+        <c:axId val="2092599880"/>
       </c:barChart>
       <c:catAx>
-        <c:axId val="2123948184"/>
+        <c:axId val="2092596904"/>
         <c:scaling>
           <c:orientation val="minMax"/>
         </c:scaling>
@@ -2264,7 +2264,7 @@
         <c:majorTickMark val="out"/>
         <c:minorTickMark val="none"/>
         <c:tickLblPos val="nextTo"/>
-        <c:crossAx val="2123527784"/>
+        <c:crossAx val="2092599880"/>
         <c:crosses val="autoZero"/>
         <c:auto val="1"/>
         <c:lblAlgn val="ctr"/>
@@ -2272,7 +2272,7 @@
         <c:noMultiLvlLbl val="0"/>
       </c:catAx>
       <c:valAx>
-        <c:axId val="2123527784"/>
+        <c:axId val="2092599880"/>
         <c:scaling>
           <c:orientation val="minMax"/>
         </c:scaling>
@@ -2283,7 +2283,7 @@
         <c:majorTickMark val="out"/>
         <c:minorTickMark val="none"/>
         <c:tickLblPos val="nextTo"/>
-        <c:crossAx val="2123948184"/>
+        <c:crossAx val="2092596904"/>
         <c:crosses val="autoZero"/>
         <c:crossBetween val="between"/>
       </c:valAx>
@@ -8637,7 +8637,11 @@
             </a:r>
             <a:r>
               <a:rPr lang="en-US" dirty="0" err="1" smtClean="0"/>
-              <a:t>igraph</a:t>
+              <a:t>IG</a:t>
+            </a:r>
+            <a:r>
+              <a:rPr lang="en-US" dirty="0" err="1" smtClean="0"/>
+              <a:t>raph</a:t>
             </a:r>
             <a:endParaRPr lang="en-US" dirty="0" smtClean="0"/>
           </a:p>
@@ -11253,7 +11257,6 @@
               <a:rPr lang="en-US" dirty="0"/>
               <a:t>Implementing k-dense</a:t>
             </a:r>
-            <a:endParaRPr lang="en-US" dirty="0"/>
           </a:p>
         </p:txBody>
       </p:sp>

</xml_diff>

<commit_message>
added assortativity in presentation
</commit_message>
<xml_diff>
--- a/presentation/kcore-kdense.pptx
+++ b/presentation/kcore-kdense.pptx
@@ -16,9 +16,10 @@
     <p:sldId id="268" r:id="rId10"/>
     <p:sldId id="262" r:id="rId11"/>
     <p:sldId id="263" r:id="rId12"/>
-    <p:sldId id="264" r:id="rId13"/>
-    <p:sldId id="269" r:id="rId14"/>
-    <p:sldId id="265" r:id="rId15"/>
+    <p:sldId id="271" r:id="rId13"/>
+    <p:sldId id="270" r:id="rId14"/>
+    <p:sldId id="269" r:id="rId15"/>
+    <p:sldId id="265" r:id="rId16"/>
   </p:sldIdLst>
   <p:sldSz cx="9144000" cy="6858000" type="screen4x3"/>
   <p:notesSz cx="6858000" cy="9144000"/>
@@ -228,11 +229,11 @@
           <c:showBubbleSize val="0"/>
         </c:dLbls>
         <c:gapWidth val="150"/>
-        <c:axId val="2097453960"/>
-        <c:axId val="2097457064"/>
+        <c:axId val="2066305512"/>
+        <c:axId val="2066304472"/>
       </c:barChart>
       <c:catAx>
-        <c:axId val="2097453960"/>
+        <c:axId val="2066305512"/>
         <c:scaling>
           <c:orientation val="minMax"/>
         </c:scaling>
@@ -242,7 +243,7 @@
         <c:majorTickMark val="out"/>
         <c:minorTickMark val="none"/>
         <c:tickLblPos val="nextTo"/>
-        <c:crossAx val="2097457064"/>
+        <c:crossAx val="2066304472"/>
         <c:crosses val="autoZero"/>
         <c:auto val="1"/>
         <c:lblAlgn val="ctr"/>
@@ -250,7 +251,7 @@
         <c:noMultiLvlLbl val="0"/>
       </c:catAx>
       <c:valAx>
-        <c:axId val="2097457064"/>
+        <c:axId val="2066304472"/>
         <c:scaling>
           <c:orientation val="minMax"/>
         </c:scaling>
@@ -261,7 +262,7 @@
         <c:majorTickMark val="out"/>
         <c:minorTickMark val="none"/>
         <c:tickLblPos val="nextTo"/>
-        <c:crossAx val="2097453960"/>
+        <c:crossAx val="2066305512"/>
         <c:crosses val="autoZero"/>
         <c:crossBetween val="between"/>
       </c:valAx>
@@ -817,11 +818,11 @@
           <c:showBubbleSize val="0"/>
         </c:dLbls>
         <c:gapWidth val="150"/>
-        <c:axId val="2097574792"/>
-        <c:axId val="2097580536"/>
+        <c:axId val="2065217880"/>
+        <c:axId val="2065223624"/>
       </c:barChart>
       <c:catAx>
-        <c:axId val="2097574792"/>
+        <c:axId val="2065217880"/>
         <c:scaling>
           <c:orientation val="minMax"/>
         </c:scaling>
@@ -856,7 +857,7 @@
         <c:majorTickMark val="out"/>
         <c:minorTickMark val="none"/>
         <c:tickLblPos val="nextTo"/>
-        <c:crossAx val="2097580536"/>
+        <c:crossAx val="2065223624"/>
         <c:crosses val="autoZero"/>
         <c:auto val="1"/>
         <c:lblAlgn val="ctr"/>
@@ -864,7 +865,7 @@
         <c:noMultiLvlLbl val="0"/>
       </c:catAx>
       <c:valAx>
-        <c:axId val="2097580536"/>
+        <c:axId val="2065223624"/>
         <c:scaling>
           <c:orientation val="minMax"/>
         </c:scaling>
@@ -875,7 +876,7 @@
         <c:majorTickMark val="out"/>
         <c:minorTickMark val="none"/>
         <c:tickLblPos val="nextTo"/>
-        <c:crossAx val="2097574792"/>
+        <c:crossAx val="2065217880"/>
         <c:crosses val="autoZero"/>
         <c:crossBetween val="between"/>
       </c:valAx>
@@ -1474,11 +1475,11 @@
         </c:dLbls>
         <c:marker val="1"/>
         <c:smooth val="0"/>
-        <c:axId val="2097613832"/>
-        <c:axId val="2097616808"/>
+        <c:axId val="2065257208"/>
+        <c:axId val="2065260184"/>
       </c:lineChart>
       <c:catAx>
-        <c:axId val="2097613832"/>
+        <c:axId val="2065257208"/>
         <c:scaling>
           <c:orientation val="minMax"/>
         </c:scaling>
@@ -1487,7 +1488,7 @@
         <c:majorTickMark val="out"/>
         <c:minorTickMark val="none"/>
         <c:tickLblPos val="nextTo"/>
-        <c:crossAx val="2097616808"/>
+        <c:crossAx val="2065260184"/>
         <c:crosses val="autoZero"/>
         <c:auto val="1"/>
         <c:lblAlgn val="ctr"/>
@@ -1496,7 +1497,7 @@
         <c:noMultiLvlLbl val="0"/>
       </c:catAx>
       <c:valAx>
-        <c:axId val="2097616808"/>
+        <c:axId val="2065260184"/>
         <c:scaling>
           <c:orientation val="minMax"/>
         </c:scaling>
@@ -1507,7 +1508,7 @@
         <c:majorTickMark val="out"/>
         <c:minorTickMark val="none"/>
         <c:tickLblPos val="nextTo"/>
-        <c:crossAx val="2097613832"/>
+        <c:crossAx val="2065257208"/>
         <c:crosses val="autoZero"/>
         <c:crossBetween val="between"/>
       </c:valAx>
@@ -1576,6 +1577,7 @@
       <c:style val="18"/>
     </mc:Fallback>
   </mc:AlternateContent>
+  <c:clrMapOvr bg1="lt1" tx1="dk1" bg2="lt2" tx2="dk2" accent1="accent1" accent2="accent2" accent3="accent3" accent4="accent4" accent5="accent5" accent6="accent6" hlink="hlink" folHlink="folHlink"/>
   <c:chart>
     <c:title>
       <c:tx>
@@ -1710,11 +1712,11 @@
           <c:showBubbleSize val="0"/>
         </c:dLbls>
         <c:gapWidth val="150"/>
-        <c:axId val="2097725704"/>
-        <c:axId val="2097728680"/>
+        <c:axId val="2072571272"/>
+        <c:axId val="2072574248"/>
       </c:barChart>
       <c:catAx>
-        <c:axId val="2097725704"/>
+        <c:axId val="2072571272"/>
         <c:scaling>
           <c:orientation val="minMax"/>
         </c:scaling>
@@ -1723,7 +1725,7 @@
         <c:majorTickMark val="out"/>
         <c:minorTickMark val="none"/>
         <c:tickLblPos val="nextTo"/>
-        <c:crossAx val="2097728680"/>
+        <c:crossAx val="2072574248"/>
         <c:crosses val="autoZero"/>
         <c:auto val="1"/>
         <c:lblAlgn val="ctr"/>
@@ -1731,7 +1733,7 @@
         <c:noMultiLvlLbl val="0"/>
       </c:catAx>
       <c:valAx>
-        <c:axId val="2097728680"/>
+        <c:axId val="2072574248"/>
         <c:scaling>
           <c:orientation val="minMax"/>
         </c:scaling>
@@ -1742,7 +1744,7 @@
         <c:majorTickMark val="out"/>
         <c:minorTickMark val="none"/>
         <c:tickLblPos val="nextTo"/>
-        <c:crossAx val="2097725704"/>
+        <c:crossAx val="2072571272"/>
         <c:crosses val="autoZero"/>
         <c:crossBetween val="between"/>
       </c:valAx>
@@ -1756,7 +1758,7 @@
     <c:dispBlanksAs val="gap"/>
     <c:showDLblsOverMax val="0"/>
   </c:chart>
-  <c:externalData r:id="rId1">
+  <c:externalData r:id="rId2">
     <c:autoUpdate val="0"/>
   </c:externalData>
 </c:chartSpace>
@@ -1775,6 +1777,7 @@
       <c:style val="18"/>
     </mc:Fallback>
   </mc:AlternateContent>
+  <c:clrMapOvr bg1="lt1" tx1="dk1" bg2="lt2" tx2="dk2" accent1="accent1" accent2="accent2" accent3="accent3" accent4="accent4" accent5="accent5" accent6="accent6" hlink="hlink" folHlink="folHlink"/>
   <c:chart>
     <c:title>
       <c:tx>
@@ -1851,11 +1854,11 @@
           <c:showBubbleSize val="0"/>
         </c:dLbls>
         <c:gapWidth val="150"/>
-        <c:axId val="2097752504"/>
-        <c:axId val="2097755480"/>
+        <c:axId val="2072251544"/>
+        <c:axId val="2072254520"/>
       </c:barChart>
       <c:catAx>
-        <c:axId val="2097752504"/>
+        <c:axId val="2072251544"/>
         <c:scaling>
           <c:orientation val="minMax"/>
         </c:scaling>
@@ -1864,7 +1867,7 @@
         <c:majorTickMark val="out"/>
         <c:minorTickMark val="none"/>
         <c:tickLblPos val="nextTo"/>
-        <c:crossAx val="2097755480"/>
+        <c:crossAx val="2072254520"/>
         <c:crosses val="autoZero"/>
         <c:auto val="1"/>
         <c:lblAlgn val="ctr"/>
@@ -1872,7 +1875,7 @@
         <c:noMultiLvlLbl val="0"/>
       </c:catAx>
       <c:valAx>
-        <c:axId val="2097755480"/>
+        <c:axId val="2072254520"/>
         <c:scaling>
           <c:orientation val="minMax"/>
         </c:scaling>
@@ -1883,7 +1886,7 @@
         <c:majorTickMark val="out"/>
         <c:minorTickMark val="none"/>
         <c:tickLblPos val="nextTo"/>
-        <c:crossAx val="2097752504"/>
+        <c:crossAx val="2072251544"/>
         <c:crosses val="autoZero"/>
         <c:crossBetween val="between"/>
       </c:valAx>
@@ -1897,7 +1900,7 @@
     <c:dispBlanksAs val="gap"/>
     <c:showDLblsOverMax val="0"/>
   </c:chart>
-  <c:externalData r:id="rId1">
+  <c:externalData r:id="rId2">
     <c:autoUpdate val="0"/>
   </c:externalData>
 </c:chartSpace>
@@ -2051,11 +2054,11 @@
           <c:showBubbleSize val="0"/>
         </c:dLbls>
         <c:gapWidth val="150"/>
-        <c:axId val="2092555736"/>
-        <c:axId val="2092558712"/>
+        <c:axId val="2065425352"/>
+        <c:axId val="2065428328"/>
       </c:barChart>
       <c:catAx>
-        <c:axId val="2092555736"/>
+        <c:axId val="2065425352"/>
         <c:scaling>
           <c:orientation val="minMax"/>
         </c:scaling>
@@ -2064,7 +2067,7 @@
         <c:majorTickMark val="out"/>
         <c:minorTickMark val="none"/>
         <c:tickLblPos val="nextTo"/>
-        <c:crossAx val="2092558712"/>
+        <c:crossAx val="2065428328"/>
         <c:crosses val="autoZero"/>
         <c:auto val="1"/>
         <c:lblAlgn val="ctr"/>
@@ -2072,7 +2075,7 @@
         <c:noMultiLvlLbl val="0"/>
       </c:catAx>
       <c:valAx>
-        <c:axId val="2092558712"/>
+        <c:axId val="2065428328"/>
         <c:scaling>
           <c:orientation val="minMax"/>
         </c:scaling>
@@ -2083,7 +2086,7 @@
         <c:majorTickMark val="out"/>
         <c:minorTickMark val="none"/>
         <c:tickLblPos val="nextTo"/>
-        <c:crossAx val="2092555736"/>
+        <c:crossAx val="2065425352"/>
         <c:crosses val="autoZero"/>
         <c:crossBetween val="between"/>
       </c:valAx>
@@ -2251,11 +2254,11 @@
           <c:showBubbleSize val="0"/>
         </c:dLbls>
         <c:gapWidth val="150"/>
-        <c:axId val="2092596904"/>
-        <c:axId val="2092599880"/>
+        <c:axId val="2065466520"/>
+        <c:axId val="2065469496"/>
       </c:barChart>
       <c:catAx>
-        <c:axId val="2092596904"/>
+        <c:axId val="2065466520"/>
         <c:scaling>
           <c:orientation val="minMax"/>
         </c:scaling>
@@ -2264,7 +2267,7 @@
         <c:majorTickMark val="out"/>
         <c:minorTickMark val="none"/>
         <c:tickLblPos val="nextTo"/>
-        <c:crossAx val="2092599880"/>
+        <c:crossAx val="2065469496"/>
         <c:crosses val="autoZero"/>
         <c:auto val="1"/>
         <c:lblAlgn val="ctr"/>
@@ -2272,7 +2275,7 @@
         <c:noMultiLvlLbl val="0"/>
       </c:catAx>
       <c:valAx>
-        <c:axId val="2092599880"/>
+        <c:axId val="2065469496"/>
         <c:scaling>
           <c:orientation val="minMax"/>
         </c:scaling>
@@ -2283,7 +2286,7 @@
         <c:majorTickMark val="out"/>
         <c:minorTickMark val="none"/>
         <c:tickLblPos val="nextTo"/>
-        <c:crossAx val="2092596904"/>
+        <c:crossAx val="2065466520"/>
         <c:crosses val="autoZero"/>
         <c:crossBetween val="between"/>
       </c:valAx>
@@ -2594,7 +2597,7 @@
           <a:p>
             <a:fld id="{76A98DAD-5796-154F-9D08-20EF7FFE737C}" type="datetimeFigureOut">
               <a:rPr lang="en-US" smtClean="0"/>
-              <a:t>9/19/12</a:t>
+              <a:t>9/20/12</a:t>
             </a:fld>
             <a:endParaRPr lang="en-US"/>
           </a:p>
@@ -2787,7 +2790,7 @@
           <a:p>
             <a:fld id="{76A98DAD-5796-154F-9D08-20EF7FFE737C}" type="datetimeFigureOut">
               <a:rPr lang="en-US" smtClean="0"/>
-              <a:t>9/19/12</a:t>
+              <a:t>9/20/12</a:t>
             </a:fld>
             <a:endParaRPr lang="en-US"/>
           </a:p>
@@ -2972,7 +2975,7 @@
           <a:p>
             <a:fld id="{76A98DAD-5796-154F-9D08-20EF7FFE737C}" type="datetimeFigureOut">
               <a:rPr lang="en-US" smtClean="0"/>
-              <a:t>9/19/12</a:t>
+              <a:t>9/20/12</a:t>
             </a:fld>
             <a:endParaRPr lang="en-US"/>
           </a:p>
@@ -3235,7 +3238,7 @@
           <a:p>
             <a:fld id="{76A98DAD-5796-154F-9D08-20EF7FFE737C}" type="datetimeFigureOut">
               <a:rPr lang="en-US" smtClean="0"/>
-              <a:t>9/19/12</a:t>
+              <a:t>9/20/12</a:t>
             </a:fld>
             <a:endParaRPr lang="en-US"/>
           </a:p>
@@ -3651,7 +3654,7 @@
           <a:p>
             <a:fld id="{76A98DAD-5796-154F-9D08-20EF7FFE737C}" type="datetimeFigureOut">
               <a:rPr lang="en-US" smtClean="0"/>
-              <a:t>9/19/12</a:t>
+              <a:t>9/20/12</a:t>
             </a:fld>
             <a:endParaRPr lang="en-US"/>
           </a:p>
@@ -3893,7 +3896,7 @@
           <a:p>
             <a:fld id="{76A98DAD-5796-154F-9D08-20EF7FFE737C}" type="datetimeFigureOut">
               <a:rPr lang="en-US" smtClean="0"/>
-              <a:t>9/19/12</a:t>
+              <a:t>9/20/12</a:t>
             </a:fld>
             <a:endParaRPr lang="en-US"/>
           </a:p>
@@ -4129,7 +4132,7 @@
           <a:p>
             <a:fld id="{76A98DAD-5796-154F-9D08-20EF7FFE737C}" type="datetimeFigureOut">
               <a:rPr lang="en-US" smtClean="0"/>
-              <a:t>9/19/12</a:t>
+              <a:t>9/20/12</a:t>
             </a:fld>
             <a:endParaRPr lang="en-US"/>
           </a:p>
@@ -4324,7 +4327,7 @@
           <a:p>
             <a:fld id="{76A98DAD-5796-154F-9D08-20EF7FFE737C}" type="datetimeFigureOut">
               <a:rPr lang="en-US" smtClean="0"/>
-              <a:t>9/19/12</a:t>
+              <a:t>9/20/12</a:t>
             </a:fld>
             <a:endParaRPr lang="en-US"/>
           </a:p>
@@ -4422,7 +4425,7 @@
           <a:p>
             <a:fld id="{76A98DAD-5796-154F-9D08-20EF7FFE737C}" type="datetimeFigureOut">
               <a:rPr lang="en-US" smtClean="0"/>
-              <a:t>9/19/12</a:t>
+              <a:t>9/20/12</a:t>
             </a:fld>
             <a:endParaRPr lang="en-US"/>
           </a:p>
@@ -4558,7 +4561,7 @@
           <a:p>
             <a:fld id="{76A98DAD-5796-154F-9D08-20EF7FFE737C}" type="datetimeFigureOut">
               <a:rPr lang="en-US" smtClean="0"/>
-              <a:t>9/19/12</a:t>
+              <a:t>9/20/12</a:t>
             </a:fld>
             <a:endParaRPr lang="en-US"/>
           </a:p>
@@ -5077,7 +5080,7 @@
           <a:p>
             <a:fld id="{76A98DAD-5796-154F-9D08-20EF7FFE737C}" type="datetimeFigureOut">
               <a:rPr lang="en-US" smtClean="0"/>
-              <a:t>9/19/12</a:t>
+              <a:t>9/20/12</a:t>
             </a:fld>
             <a:endParaRPr lang="en-US"/>
           </a:p>
@@ -5338,7 +5341,7 @@
           <a:p>
             <a:fld id="{76A98DAD-5796-154F-9D08-20EF7FFE737C}" type="datetimeFigureOut">
               <a:rPr lang="en-US" smtClean="0"/>
-              <a:t>9/19/12</a:t>
+              <a:t>9/20/12</a:t>
             </a:fld>
             <a:endParaRPr lang="en-US"/>
           </a:p>
@@ -7425,6 +7428,178 @@
         </p:nvSpPr>
         <p:spPr/>
         <p:txBody>
+          <a:bodyPr/>
+          <a:lstStyle/>
+          <a:p>
+            <a:r>
+              <a:rPr lang="en-US" dirty="0"/>
+              <a:t>Maximal communities</a:t>
+            </a:r>
+          </a:p>
+        </p:txBody>
+      </p:sp>
+      <p:sp>
+        <p:nvSpPr>
+          <p:cNvPr id="5" name="Content Placeholder 4"/>
+          <p:cNvSpPr>
+            <a:spLocks noGrp="1"/>
+          </p:cNvSpPr>
+          <p:nvPr>
+            <p:ph sz="quarter" idx="2"/>
+          </p:nvPr>
+        </p:nvSpPr>
+        <p:spPr/>
+        <p:txBody>
+          <a:bodyPr/>
+          <a:lstStyle/>
+          <a:p>
+            <a:r>
+              <a:rPr lang="en-US" dirty="0" smtClean="0"/>
+              <a:t># nodes: 141</a:t>
+            </a:r>
+          </a:p>
+          <a:p>
+            <a:r>
+              <a:rPr lang="en-US" dirty="0" err="1" smtClean="0"/>
+              <a:t>Assortativity</a:t>
+            </a:r>
+            <a:r>
+              <a:rPr lang="en-US" dirty="0" smtClean="0"/>
+              <a:t>: -0.16</a:t>
+            </a:r>
+            <a:endParaRPr lang="en-US" dirty="0"/>
+          </a:p>
+        </p:txBody>
+      </p:sp>
+      <p:sp>
+        <p:nvSpPr>
+          <p:cNvPr id="7" name="Content Placeholder 6"/>
+          <p:cNvSpPr>
+            <a:spLocks noGrp="1"/>
+          </p:cNvSpPr>
+          <p:nvPr>
+            <p:ph sz="quarter" idx="4"/>
+          </p:nvPr>
+        </p:nvSpPr>
+        <p:spPr/>
+        <p:txBody>
+          <a:bodyPr/>
+          <a:lstStyle/>
+          <a:p>
+            <a:r>
+              <a:rPr lang="en-US" dirty="0" smtClean="0"/>
+              <a:t># nodes: 64</a:t>
+            </a:r>
+          </a:p>
+          <a:p>
+            <a:r>
+              <a:rPr lang="en-US" dirty="0" err="1" smtClean="0"/>
+              <a:t>Assortativity</a:t>
+            </a:r>
+            <a:r>
+              <a:rPr lang="en-US" dirty="0" smtClean="0"/>
+              <a:t>: -0.11</a:t>
+            </a:r>
+            <a:endParaRPr lang="en-US" dirty="0"/>
+          </a:p>
+        </p:txBody>
+      </p:sp>
+      <p:sp>
+        <p:nvSpPr>
+          <p:cNvPr id="4" name="Text Placeholder 3"/>
+          <p:cNvSpPr>
+            <a:spLocks noGrp="1"/>
+          </p:cNvSpPr>
+          <p:nvPr>
+            <p:ph type="body" sz="quarter" idx="1"/>
+          </p:nvPr>
+        </p:nvSpPr>
+        <p:spPr/>
+        <p:txBody>
+          <a:bodyPr/>
+          <a:lstStyle/>
+          <a:p>
+            <a:r>
+              <a:rPr lang="en-US" dirty="0"/>
+              <a:t>k</a:t>
+            </a:r>
+            <a:r>
+              <a:rPr lang="en-US" dirty="0" smtClean="0"/>
+              <a:t>-core</a:t>
+            </a:r>
+            <a:endParaRPr lang="en-US" dirty="0"/>
+          </a:p>
+        </p:txBody>
+      </p:sp>
+      <p:sp>
+        <p:nvSpPr>
+          <p:cNvPr id="6" name="Text Placeholder 5"/>
+          <p:cNvSpPr>
+            <a:spLocks noGrp="1"/>
+          </p:cNvSpPr>
+          <p:nvPr>
+            <p:ph type="body" sz="quarter" idx="3"/>
+          </p:nvPr>
+        </p:nvSpPr>
+        <p:spPr/>
+        <p:txBody>
+          <a:bodyPr/>
+          <a:lstStyle/>
+          <a:p>
+            <a:r>
+              <a:rPr lang="en-US" dirty="0"/>
+              <a:t>k</a:t>
+            </a:r>
+            <a:r>
+              <a:rPr lang="en-US" dirty="0" smtClean="0"/>
+              <a:t>-dense</a:t>
+            </a:r>
+            <a:endParaRPr lang="en-US" dirty="0"/>
+          </a:p>
+        </p:txBody>
+      </p:sp>
+    </p:spTree>
+    <p:extLst>
+      <p:ext uri="{BB962C8B-B14F-4D97-AF65-F5344CB8AC3E}">
+        <p14:creationId xmlns:p14="http://schemas.microsoft.com/office/powerpoint/2010/main" val="2671242723"/>
+      </p:ext>
+    </p:extLst>
+  </p:cSld>
+  <p:clrMapOvr>
+    <a:masterClrMapping/>
+  </p:clrMapOvr>
+</p:sld>
+</file>
+
+<file path=ppt/slides/slide13.xml><?xml version="1.0" encoding="utf-8"?>
+<p:sld xmlns:a="http://schemas.openxmlformats.org/drawingml/2006/main" xmlns:r="http://schemas.openxmlformats.org/officeDocument/2006/relationships" xmlns:p="http://schemas.openxmlformats.org/presentationml/2006/main">
+  <p:cSld>
+    <p:spTree>
+      <p:nvGrpSpPr>
+        <p:cNvPr id="1" name=""/>
+        <p:cNvGrpSpPr/>
+        <p:nvPr/>
+      </p:nvGrpSpPr>
+      <p:grpSpPr>
+        <a:xfrm>
+          <a:off x="0" y="0"/>
+          <a:ext cx="0" cy="0"/>
+          <a:chOff x="0" y="0"/>
+          <a:chExt cx="0" cy="0"/>
+        </a:xfrm>
+      </p:grpSpPr>
+      <p:sp>
+        <p:nvSpPr>
+          <p:cNvPr id="2" name="Title 1"/>
+          <p:cNvSpPr>
+            <a:spLocks noGrp="1"/>
+          </p:cNvSpPr>
+          <p:nvPr>
+            <p:ph type="title"/>
+          </p:nvPr>
+        </p:nvSpPr>
+        <p:spPr/>
+        <p:txBody>
           <a:bodyPr>
             <a:normAutofit/>
           </a:bodyPr>
@@ -7447,7 +7622,7 @@
           <p:nvPr>
             <p:extLst>
               <p:ext uri="{D42A27DB-BD31-4B8C-83A1-F6EECF244321}">
-                <p14:modId xmlns:p14="http://schemas.microsoft.com/office/powerpoint/2010/main" val="2070130079"/>
+                <p14:modId xmlns:p14="http://schemas.microsoft.com/office/powerpoint/2010/main" val="3721469956"/>
               </p:ext>
             </p:extLst>
           </p:nvPr>
@@ -7471,7 +7646,7 @@
           <p:nvPr>
             <p:extLst>
               <p:ext uri="{D42A27DB-BD31-4B8C-83A1-F6EECF244321}">
-                <p14:modId xmlns:p14="http://schemas.microsoft.com/office/powerpoint/2010/main" val="2534596325"/>
+                <p14:modId xmlns:p14="http://schemas.microsoft.com/office/powerpoint/2010/main" val="1918321156"/>
               </p:ext>
             </p:extLst>
           </p:nvPr>
@@ -7677,7 +7852,7 @@
     </p:spTree>
     <p:extLst>
       <p:ext uri="{BB962C8B-B14F-4D97-AF65-F5344CB8AC3E}">
-        <p14:creationId xmlns:p14="http://schemas.microsoft.com/office/powerpoint/2010/main" val="277593316"/>
+        <p14:creationId xmlns:p14="http://schemas.microsoft.com/office/powerpoint/2010/main" val="4261155439"/>
       </p:ext>
     </p:extLst>
   </p:cSld>
@@ -7808,7 +7983,7 @@
 </p:sld>
 </file>
 
-<file path=ppt/slides/slide13.xml><?xml version="1.0" encoding="utf-8"?>
+<file path=ppt/slides/slide14.xml><?xml version="1.0" encoding="utf-8"?>
 <p:sld xmlns:a="http://schemas.openxmlformats.org/drawingml/2006/main" xmlns:r="http://schemas.openxmlformats.org/officeDocument/2006/relationships" xmlns:p="http://schemas.openxmlformats.org/presentationml/2006/main">
   <p:cSld>
     <p:spTree>
@@ -8465,7 +8640,7 @@
 </p:sld>
 </file>
 
-<file path=ppt/slides/slide14.xml><?xml version="1.0" encoding="utf-8"?>
+<file path=ppt/slides/slide15.xml><?xml version="1.0" encoding="utf-8"?>
 <p:sld xmlns:a="http://schemas.openxmlformats.org/drawingml/2006/main" xmlns:r="http://schemas.openxmlformats.org/officeDocument/2006/relationships" xmlns:p="http://schemas.openxmlformats.org/presentationml/2006/main">
   <p:cSld>
     <p:spTree>
@@ -8637,11 +8812,7 @@
             </a:r>
             <a:r>
               <a:rPr lang="en-US" dirty="0" err="1" smtClean="0"/>
-              <a:t>IG</a:t>
-            </a:r>
-            <a:r>
-              <a:rPr lang="en-US" dirty="0" err="1" smtClean="0"/>
-              <a:t>raph</a:t>
+              <a:t>IGraph</a:t>
             </a:r>
             <a:endParaRPr lang="en-US" dirty="0" smtClean="0"/>
           </a:p>
@@ -11792,6 +11963,458 @@
 
 <file path=ppt/theme/themeOverride1.xml><?xml version="1.0" encoding="utf-8"?>
 <a:themeOverride xmlns:a="http://schemas.openxmlformats.org/drawingml/2006/main">
+  <a:clrScheme name="Apothecary">
+    <a:dk1>
+      <a:sysClr val="windowText" lastClr="000000"/>
+    </a:dk1>
+    <a:lt1>
+      <a:sysClr val="window" lastClr="FFFFFF"/>
+    </a:lt1>
+    <a:dk2>
+      <a:srgbClr val="564B3C"/>
+    </a:dk2>
+    <a:lt2>
+      <a:srgbClr val="ECEDD1"/>
+    </a:lt2>
+    <a:accent1>
+      <a:srgbClr val="93A299"/>
+    </a:accent1>
+    <a:accent2>
+      <a:srgbClr val="CF543F"/>
+    </a:accent2>
+    <a:accent3>
+      <a:srgbClr val="B5AE53"/>
+    </a:accent3>
+    <a:accent4>
+      <a:srgbClr val="848058"/>
+    </a:accent4>
+    <a:accent5>
+      <a:srgbClr val="E8B54D"/>
+    </a:accent5>
+    <a:accent6>
+      <a:srgbClr val="786C71"/>
+    </a:accent6>
+    <a:hlink>
+      <a:srgbClr val="CCCC00"/>
+    </a:hlink>
+    <a:folHlink>
+      <a:srgbClr val="B2B2B2"/>
+    </a:folHlink>
+  </a:clrScheme>
+  <a:fontScheme name="Adjacency">
+    <a:majorFont>
+      <a:latin typeface="Cambria"/>
+      <a:ea typeface=""/>
+      <a:cs typeface=""/>
+      <a:font script="Jpan" typeface="ＭＳ ゴシック"/>
+      <a:font script="Hang" typeface="맑은 고딕"/>
+      <a:font script="Hans" typeface="宋体"/>
+      <a:font script="Hant" typeface="新細明體"/>
+      <a:font script="Arab" typeface="Times New Roman"/>
+      <a:font script="Hebr" typeface="Times New Roman"/>
+      <a:font script="Thai" typeface="Angsana New"/>
+      <a:font script="Ethi" typeface="Nyala"/>
+      <a:font script="Beng" typeface="Vrinda"/>
+      <a:font script="Gujr" typeface="Shruti"/>
+      <a:font script="Khmr" typeface="MoolBoran"/>
+      <a:font script="Knda" typeface="Tunga"/>
+      <a:font script="Guru" typeface="Raavi"/>
+      <a:font script="Cans" typeface="Euphemia"/>
+      <a:font script="Cher" typeface="Plantagenet Cherokee"/>
+      <a:font script="Yiii" typeface="Microsoft Yi Baiti"/>
+      <a:font script="Tibt" typeface="Microsoft Himalaya"/>
+      <a:font script="Thaa" typeface="MV Boli"/>
+      <a:font script="Deva" typeface="Mangal"/>
+      <a:font script="Telu" typeface="Gautami"/>
+      <a:font script="Taml" typeface="Latha"/>
+      <a:font script="Syrc" typeface="Estrangelo Edessa"/>
+      <a:font script="Orya" typeface="Kalinga"/>
+      <a:font script="Mlym" typeface="Kartika"/>
+      <a:font script="Laoo" typeface="DokChampa"/>
+      <a:font script="Sinh" typeface="Iskoola Pota"/>
+      <a:font script="Mong" typeface="Mongolian Baiti"/>
+      <a:font script="Viet" typeface="Times New Roman"/>
+      <a:font script="Uigh" typeface="Microsoft Uighur"/>
+      <a:font script="Geor" typeface="Sylfaen"/>
+    </a:majorFont>
+    <a:minorFont>
+      <a:latin typeface="Calibri"/>
+      <a:ea typeface=""/>
+      <a:cs typeface=""/>
+      <a:font script="Jpan" typeface="ＭＳ 明朝"/>
+      <a:font script="Hang" typeface="맑은 고딕"/>
+      <a:font script="Hans" typeface="宋体"/>
+      <a:font script="Hant" typeface="新細明體"/>
+      <a:font script="Arab" typeface="Arial"/>
+      <a:font script="Hebr" typeface="Arial"/>
+      <a:font script="Thai" typeface="Cordia New"/>
+      <a:font script="Ethi" typeface="Nyala"/>
+      <a:font script="Beng" typeface="Vrinda"/>
+      <a:font script="Gujr" typeface="Shruti"/>
+      <a:font script="Khmr" typeface="DaunPenh"/>
+      <a:font script="Knda" typeface="Tunga"/>
+      <a:font script="Guru" typeface="Raavi"/>
+      <a:font script="Cans" typeface="Euphemia"/>
+      <a:font script="Cher" typeface="Plantagenet Cherokee"/>
+      <a:font script="Yiii" typeface="Microsoft Yi Baiti"/>
+      <a:font script="Tibt" typeface="Microsoft Himalaya"/>
+      <a:font script="Thaa" typeface="MV Boli"/>
+      <a:font script="Deva" typeface="Mangal"/>
+      <a:font script="Telu" typeface="Gautami"/>
+      <a:font script="Taml" typeface="Latha"/>
+      <a:font script="Syrc" typeface="Estrangelo Edessa"/>
+      <a:font script="Orya" typeface="Kalinga"/>
+      <a:font script="Mlym" typeface="Kartika"/>
+      <a:font script="Laoo" typeface="DokChampa"/>
+      <a:font script="Sinh" typeface="Iskoola Pota"/>
+      <a:font script="Mong" typeface="Mongolian Baiti"/>
+      <a:font script="Viet" typeface="Arial"/>
+      <a:font script="Uigh" typeface="Microsoft Uighur"/>
+      <a:font script="Geor" typeface="Sylfaen"/>
+    </a:minorFont>
+  </a:fontScheme>
+  <a:fmtScheme name="Median">
+    <a:fillStyleLst>
+      <a:solidFill>
+        <a:schemeClr val="phClr"/>
+      </a:solidFill>
+      <a:solidFill>
+        <a:schemeClr val="phClr">
+          <a:tint val="50000"/>
+        </a:schemeClr>
+      </a:solidFill>
+      <a:solidFill>
+        <a:schemeClr val="phClr"/>
+      </a:solidFill>
+    </a:fillStyleLst>
+    <a:lnStyleLst>
+      <a:ln w="10000" cap="flat" cmpd="sng" algn="ctr">
+        <a:solidFill>
+          <a:schemeClr val="phClr"/>
+        </a:solidFill>
+        <a:prstDash val="solid"/>
+      </a:ln>
+      <a:ln w="19050" cap="flat" cmpd="sng" algn="ctr">
+        <a:solidFill>
+          <a:schemeClr val="phClr"/>
+        </a:solidFill>
+        <a:prstDash val="solid"/>
+      </a:ln>
+      <a:ln w="47625" cap="flat" cmpd="dbl" algn="ctr">
+        <a:solidFill>
+          <a:schemeClr val="phClr"/>
+        </a:solidFill>
+        <a:prstDash val="solid"/>
+      </a:ln>
+    </a:lnStyleLst>
+    <a:effectStyleLst>
+      <a:effectStyle>
+        <a:effectLst>
+          <a:outerShdw blurRad="38100" dist="30000" dir="5400000" rotWithShape="0">
+            <a:srgbClr val="000000">
+              <a:alpha val="45000"/>
+            </a:srgbClr>
+          </a:outerShdw>
+        </a:effectLst>
+      </a:effectStyle>
+      <a:effectStyle>
+        <a:effectLst>
+          <a:outerShdw blurRad="38100" dist="30000" dir="5400000" rotWithShape="0">
+            <a:srgbClr val="000000">
+              <a:alpha val="45000"/>
+            </a:srgbClr>
+          </a:outerShdw>
+        </a:effectLst>
+      </a:effectStyle>
+      <a:effectStyle>
+        <a:effectLst>
+          <a:outerShdw blurRad="38100" dist="25400" dir="5400000" rotWithShape="0">
+            <a:srgbClr val="000000">
+              <a:alpha val="35000"/>
+            </a:srgbClr>
+          </a:outerShdw>
+        </a:effectLst>
+        <a:scene3d>
+          <a:camera prst="isometricTopDown" fov="0">
+            <a:rot lat="0" lon="0" rev="0"/>
+          </a:camera>
+          <a:lightRig rig="balanced" dir="t">
+            <a:rot lat="0" lon="0" rev="13800000"/>
+          </a:lightRig>
+        </a:scene3d>
+        <a:sp3d extrusionH="12700" prstMaterial="plastic">
+          <a:bevelT w="38100" h="25400" prst="softRound"/>
+          <a:contourClr>
+            <a:schemeClr val="phClr"/>
+          </a:contourClr>
+        </a:sp3d>
+      </a:effectStyle>
+    </a:effectStyleLst>
+    <a:bgFillStyleLst>
+      <a:solidFill>
+        <a:schemeClr val="phClr"/>
+      </a:solidFill>
+      <a:blipFill>
+        <a:blip xmlns:r="http://schemas.openxmlformats.org/officeDocument/2006/relationships" r:embed="rId1">
+          <a:duotone>
+            <a:schemeClr val="phClr">
+              <a:shade val="90000"/>
+              <a:satMod val="140000"/>
+            </a:schemeClr>
+            <a:schemeClr val="phClr">
+              <a:satMod val="120000"/>
+            </a:schemeClr>
+          </a:duotone>
+        </a:blip>
+        <a:tile tx="0" ty="0" sx="100000" sy="100000" flip="none" algn="tl"/>
+      </a:blipFill>
+      <a:blipFill>
+        <a:blip xmlns:r="http://schemas.openxmlformats.org/officeDocument/2006/relationships" r:embed="rId2">
+          <a:duotone>
+            <a:schemeClr val="phClr">
+              <a:shade val="90000"/>
+              <a:satMod val="140000"/>
+            </a:schemeClr>
+            <a:schemeClr val="phClr">
+              <a:satMod val="120000"/>
+            </a:schemeClr>
+          </a:duotone>
+        </a:blip>
+        <a:tile tx="0" ty="0" sx="100000" sy="100000" flip="none" algn="tl"/>
+      </a:blipFill>
+    </a:bgFillStyleLst>
+  </a:fmtScheme>
+</a:themeOverride>
+</file>
+
+<file path=ppt/theme/themeOverride2.xml><?xml version="1.0" encoding="utf-8"?>
+<a:themeOverride xmlns:a="http://schemas.openxmlformats.org/drawingml/2006/main">
+  <a:clrScheme name="Apothecary">
+    <a:dk1>
+      <a:sysClr val="windowText" lastClr="000000"/>
+    </a:dk1>
+    <a:lt1>
+      <a:sysClr val="window" lastClr="FFFFFF"/>
+    </a:lt1>
+    <a:dk2>
+      <a:srgbClr val="564B3C"/>
+    </a:dk2>
+    <a:lt2>
+      <a:srgbClr val="ECEDD1"/>
+    </a:lt2>
+    <a:accent1>
+      <a:srgbClr val="93A299"/>
+    </a:accent1>
+    <a:accent2>
+      <a:srgbClr val="CF543F"/>
+    </a:accent2>
+    <a:accent3>
+      <a:srgbClr val="B5AE53"/>
+    </a:accent3>
+    <a:accent4>
+      <a:srgbClr val="848058"/>
+    </a:accent4>
+    <a:accent5>
+      <a:srgbClr val="E8B54D"/>
+    </a:accent5>
+    <a:accent6>
+      <a:srgbClr val="786C71"/>
+    </a:accent6>
+    <a:hlink>
+      <a:srgbClr val="CCCC00"/>
+    </a:hlink>
+    <a:folHlink>
+      <a:srgbClr val="B2B2B2"/>
+    </a:folHlink>
+  </a:clrScheme>
+  <a:fontScheme name="Adjacency">
+    <a:majorFont>
+      <a:latin typeface="Cambria"/>
+      <a:ea typeface=""/>
+      <a:cs typeface=""/>
+      <a:font script="Jpan" typeface="ＭＳ ゴシック"/>
+      <a:font script="Hang" typeface="맑은 고딕"/>
+      <a:font script="Hans" typeface="宋体"/>
+      <a:font script="Hant" typeface="新細明體"/>
+      <a:font script="Arab" typeface="Times New Roman"/>
+      <a:font script="Hebr" typeface="Times New Roman"/>
+      <a:font script="Thai" typeface="Angsana New"/>
+      <a:font script="Ethi" typeface="Nyala"/>
+      <a:font script="Beng" typeface="Vrinda"/>
+      <a:font script="Gujr" typeface="Shruti"/>
+      <a:font script="Khmr" typeface="MoolBoran"/>
+      <a:font script="Knda" typeface="Tunga"/>
+      <a:font script="Guru" typeface="Raavi"/>
+      <a:font script="Cans" typeface="Euphemia"/>
+      <a:font script="Cher" typeface="Plantagenet Cherokee"/>
+      <a:font script="Yiii" typeface="Microsoft Yi Baiti"/>
+      <a:font script="Tibt" typeface="Microsoft Himalaya"/>
+      <a:font script="Thaa" typeface="MV Boli"/>
+      <a:font script="Deva" typeface="Mangal"/>
+      <a:font script="Telu" typeface="Gautami"/>
+      <a:font script="Taml" typeface="Latha"/>
+      <a:font script="Syrc" typeface="Estrangelo Edessa"/>
+      <a:font script="Orya" typeface="Kalinga"/>
+      <a:font script="Mlym" typeface="Kartika"/>
+      <a:font script="Laoo" typeface="DokChampa"/>
+      <a:font script="Sinh" typeface="Iskoola Pota"/>
+      <a:font script="Mong" typeface="Mongolian Baiti"/>
+      <a:font script="Viet" typeface="Times New Roman"/>
+      <a:font script="Uigh" typeface="Microsoft Uighur"/>
+      <a:font script="Geor" typeface="Sylfaen"/>
+    </a:majorFont>
+    <a:minorFont>
+      <a:latin typeface="Calibri"/>
+      <a:ea typeface=""/>
+      <a:cs typeface=""/>
+      <a:font script="Jpan" typeface="ＭＳ 明朝"/>
+      <a:font script="Hang" typeface="맑은 고딕"/>
+      <a:font script="Hans" typeface="宋体"/>
+      <a:font script="Hant" typeface="新細明體"/>
+      <a:font script="Arab" typeface="Arial"/>
+      <a:font script="Hebr" typeface="Arial"/>
+      <a:font script="Thai" typeface="Cordia New"/>
+      <a:font script="Ethi" typeface="Nyala"/>
+      <a:font script="Beng" typeface="Vrinda"/>
+      <a:font script="Gujr" typeface="Shruti"/>
+      <a:font script="Khmr" typeface="DaunPenh"/>
+      <a:font script="Knda" typeface="Tunga"/>
+      <a:font script="Guru" typeface="Raavi"/>
+      <a:font script="Cans" typeface="Euphemia"/>
+      <a:font script="Cher" typeface="Plantagenet Cherokee"/>
+      <a:font script="Yiii" typeface="Microsoft Yi Baiti"/>
+      <a:font script="Tibt" typeface="Microsoft Himalaya"/>
+      <a:font script="Thaa" typeface="MV Boli"/>
+      <a:font script="Deva" typeface="Mangal"/>
+      <a:font script="Telu" typeface="Gautami"/>
+      <a:font script="Taml" typeface="Latha"/>
+      <a:font script="Syrc" typeface="Estrangelo Edessa"/>
+      <a:font script="Orya" typeface="Kalinga"/>
+      <a:font script="Mlym" typeface="Kartika"/>
+      <a:font script="Laoo" typeface="DokChampa"/>
+      <a:font script="Sinh" typeface="Iskoola Pota"/>
+      <a:font script="Mong" typeface="Mongolian Baiti"/>
+      <a:font script="Viet" typeface="Arial"/>
+      <a:font script="Uigh" typeface="Microsoft Uighur"/>
+      <a:font script="Geor" typeface="Sylfaen"/>
+    </a:minorFont>
+  </a:fontScheme>
+  <a:fmtScheme name="Median">
+    <a:fillStyleLst>
+      <a:solidFill>
+        <a:schemeClr val="phClr"/>
+      </a:solidFill>
+      <a:solidFill>
+        <a:schemeClr val="phClr">
+          <a:tint val="50000"/>
+        </a:schemeClr>
+      </a:solidFill>
+      <a:solidFill>
+        <a:schemeClr val="phClr"/>
+      </a:solidFill>
+    </a:fillStyleLst>
+    <a:lnStyleLst>
+      <a:ln w="10000" cap="flat" cmpd="sng" algn="ctr">
+        <a:solidFill>
+          <a:schemeClr val="phClr"/>
+        </a:solidFill>
+        <a:prstDash val="solid"/>
+      </a:ln>
+      <a:ln w="19050" cap="flat" cmpd="sng" algn="ctr">
+        <a:solidFill>
+          <a:schemeClr val="phClr"/>
+        </a:solidFill>
+        <a:prstDash val="solid"/>
+      </a:ln>
+      <a:ln w="47625" cap="flat" cmpd="dbl" algn="ctr">
+        <a:solidFill>
+          <a:schemeClr val="phClr"/>
+        </a:solidFill>
+        <a:prstDash val="solid"/>
+      </a:ln>
+    </a:lnStyleLst>
+    <a:effectStyleLst>
+      <a:effectStyle>
+        <a:effectLst>
+          <a:outerShdw blurRad="38100" dist="30000" dir="5400000" rotWithShape="0">
+            <a:srgbClr val="000000">
+              <a:alpha val="45000"/>
+            </a:srgbClr>
+          </a:outerShdw>
+        </a:effectLst>
+      </a:effectStyle>
+      <a:effectStyle>
+        <a:effectLst>
+          <a:outerShdw blurRad="38100" dist="30000" dir="5400000" rotWithShape="0">
+            <a:srgbClr val="000000">
+              <a:alpha val="45000"/>
+            </a:srgbClr>
+          </a:outerShdw>
+        </a:effectLst>
+      </a:effectStyle>
+      <a:effectStyle>
+        <a:effectLst>
+          <a:outerShdw blurRad="38100" dist="25400" dir="5400000" rotWithShape="0">
+            <a:srgbClr val="000000">
+              <a:alpha val="35000"/>
+            </a:srgbClr>
+          </a:outerShdw>
+        </a:effectLst>
+        <a:scene3d>
+          <a:camera prst="isometricTopDown" fov="0">
+            <a:rot lat="0" lon="0" rev="0"/>
+          </a:camera>
+          <a:lightRig rig="balanced" dir="t">
+            <a:rot lat="0" lon="0" rev="13800000"/>
+          </a:lightRig>
+        </a:scene3d>
+        <a:sp3d extrusionH="12700" prstMaterial="plastic">
+          <a:bevelT w="38100" h="25400" prst="softRound"/>
+          <a:contourClr>
+            <a:schemeClr val="phClr"/>
+          </a:contourClr>
+        </a:sp3d>
+      </a:effectStyle>
+    </a:effectStyleLst>
+    <a:bgFillStyleLst>
+      <a:solidFill>
+        <a:schemeClr val="phClr"/>
+      </a:solidFill>
+      <a:blipFill>
+        <a:blip xmlns:r="http://schemas.openxmlformats.org/officeDocument/2006/relationships" r:embed="rId1">
+          <a:duotone>
+            <a:schemeClr val="phClr">
+              <a:shade val="90000"/>
+              <a:satMod val="140000"/>
+            </a:schemeClr>
+            <a:schemeClr val="phClr">
+              <a:satMod val="120000"/>
+            </a:schemeClr>
+          </a:duotone>
+        </a:blip>
+        <a:tile tx="0" ty="0" sx="100000" sy="100000" flip="none" algn="tl"/>
+      </a:blipFill>
+      <a:blipFill>
+        <a:blip xmlns:r="http://schemas.openxmlformats.org/officeDocument/2006/relationships" r:embed="rId2">
+          <a:duotone>
+            <a:schemeClr val="phClr">
+              <a:shade val="90000"/>
+              <a:satMod val="140000"/>
+            </a:schemeClr>
+            <a:schemeClr val="phClr">
+              <a:satMod val="120000"/>
+            </a:schemeClr>
+          </a:duotone>
+        </a:blip>
+        <a:tile tx="0" ty="0" sx="100000" sy="100000" flip="none" algn="tl"/>
+      </a:blipFill>
+    </a:bgFillStyleLst>
+  </a:fmtScheme>
+</a:themeOverride>
+</file>
+
+<file path=ppt/theme/themeOverride3.xml><?xml version="1.0" encoding="utf-8"?>
+<a:themeOverride xmlns:a="http://schemas.openxmlformats.org/drawingml/2006/main">
   <a:clrScheme name="Office">
     <a:dk1>
       <a:sysClr val="windowText" lastClr="000000"/>
@@ -12067,7 +12690,7 @@
 </a:themeOverride>
 </file>
 
-<file path=ppt/theme/themeOverride2.xml><?xml version="1.0" encoding="utf-8"?>
+<file path=ppt/theme/themeOverride4.xml><?xml version="1.0" encoding="utf-8"?>
 <a:themeOverride xmlns:a="http://schemas.openxmlformats.org/drawingml/2006/main">
   <a:clrScheme name="Office">
     <a:dk1>

</xml_diff>

<commit_message>
corrette definition in slide 3 e 4
</commit_message>
<xml_diff>
--- a/presentation/kcore-kdense.pptx
+++ b/presentation/kcore-kdense.pptx
@@ -229,11 +229,11 @@
           <c:showBubbleSize val="0"/>
         </c:dLbls>
         <c:gapWidth val="150"/>
-        <c:axId val="2048111992"/>
-        <c:axId val="2048108968"/>
+        <c:axId val="2051282696"/>
+        <c:axId val="2051310456"/>
       </c:barChart>
       <c:catAx>
-        <c:axId val="2048111992"/>
+        <c:axId val="2051282696"/>
         <c:scaling>
           <c:orientation val="minMax"/>
         </c:scaling>
@@ -243,7 +243,7 @@
         <c:majorTickMark val="out"/>
         <c:minorTickMark val="none"/>
         <c:tickLblPos val="nextTo"/>
-        <c:crossAx val="2048108968"/>
+        <c:crossAx val="2051310456"/>
         <c:crosses val="autoZero"/>
         <c:auto val="1"/>
         <c:lblAlgn val="ctr"/>
@@ -251,7 +251,7 @@
         <c:noMultiLvlLbl val="0"/>
       </c:catAx>
       <c:valAx>
-        <c:axId val="2048108968"/>
+        <c:axId val="2051310456"/>
         <c:scaling>
           <c:orientation val="minMax"/>
         </c:scaling>
@@ -262,7 +262,7 @@
         <c:majorTickMark val="out"/>
         <c:minorTickMark val="none"/>
         <c:tickLblPos val="nextTo"/>
-        <c:crossAx val="2048111992"/>
+        <c:crossAx val="2051282696"/>
         <c:crosses val="autoZero"/>
         <c:crossBetween val="between"/>
       </c:valAx>
@@ -818,11 +818,11 @@
           <c:showBubbleSize val="0"/>
         </c:dLbls>
         <c:gapWidth val="150"/>
-        <c:axId val="2048010232"/>
-        <c:axId val="2048004472"/>
+        <c:axId val="2047968136"/>
+        <c:axId val="2047973880"/>
       </c:barChart>
       <c:catAx>
-        <c:axId val="2048010232"/>
+        <c:axId val="2047968136"/>
         <c:scaling>
           <c:orientation val="minMax"/>
         </c:scaling>
@@ -857,7 +857,7 @@
         <c:majorTickMark val="out"/>
         <c:minorTickMark val="none"/>
         <c:tickLblPos val="nextTo"/>
-        <c:crossAx val="2048004472"/>
+        <c:crossAx val="2047973880"/>
         <c:crosses val="autoZero"/>
         <c:auto val="1"/>
         <c:lblAlgn val="ctr"/>
@@ -865,7 +865,7 @@
         <c:noMultiLvlLbl val="0"/>
       </c:catAx>
       <c:valAx>
-        <c:axId val="2048004472"/>
+        <c:axId val="2047973880"/>
         <c:scaling>
           <c:orientation val="minMax"/>
         </c:scaling>
@@ -876,7 +876,7 @@
         <c:majorTickMark val="out"/>
         <c:minorTickMark val="none"/>
         <c:tickLblPos val="nextTo"/>
-        <c:crossAx val="2048010232"/>
+        <c:crossAx val="2047968136"/>
         <c:crosses val="autoZero"/>
         <c:crossBetween val="between"/>
       </c:valAx>
@@ -1475,11 +1475,11 @@
         </c:dLbls>
         <c:marker val="1"/>
         <c:smooth val="0"/>
-        <c:axId val="2047970904"/>
-        <c:axId val="2047967912"/>
+        <c:axId val="2057463704"/>
+        <c:axId val="2057466680"/>
       </c:lineChart>
       <c:catAx>
-        <c:axId val="2047970904"/>
+        <c:axId val="2057463704"/>
         <c:scaling>
           <c:orientation val="minMax"/>
         </c:scaling>
@@ -1488,7 +1488,7 @@
         <c:majorTickMark val="out"/>
         <c:minorTickMark val="none"/>
         <c:tickLblPos val="nextTo"/>
-        <c:crossAx val="2047967912"/>
+        <c:crossAx val="2057466680"/>
         <c:crosses val="autoZero"/>
         <c:auto val="1"/>
         <c:lblAlgn val="ctr"/>
@@ -1497,7 +1497,7 @@
         <c:noMultiLvlLbl val="0"/>
       </c:catAx>
       <c:valAx>
-        <c:axId val="2047967912"/>
+        <c:axId val="2057466680"/>
         <c:scaling>
           <c:orientation val="minMax"/>
         </c:scaling>
@@ -1508,7 +1508,7 @@
         <c:majorTickMark val="out"/>
         <c:minorTickMark val="none"/>
         <c:tickLblPos val="nextTo"/>
-        <c:crossAx val="2047970904"/>
+        <c:crossAx val="2057463704"/>
         <c:crosses val="autoZero"/>
         <c:crossBetween val="between"/>
       </c:valAx>
@@ -1712,11 +1712,11 @@
           <c:showBubbleSize val="0"/>
         </c:dLbls>
         <c:gapWidth val="150"/>
-        <c:axId val="2047533256"/>
-        <c:axId val="2047536232"/>
+        <c:axId val="2057843736"/>
+        <c:axId val="2057825016"/>
       </c:barChart>
       <c:catAx>
-        <c:axId val="2047533256"/>
+        <c:axId val="2057843736"/>
         <c:scaling>
           <c:orientation val="minMax"/>
         </c:scaling>
@@ -1725,7 +1725,7 @@
         <c:majorTickMark val="out"/>
         <c:minorTickMark val="none"/>
         <c:tickLblPos val="nextTo"/>
-        <c:crossAx val="2047536232"/>
+        <c:crossAx val="2057825016"/>
         <c:crosses val="autoZero"/>
         <c:auto val="1"/>
         <c:lblAlgn val="ctr"/>
@@ -1733,7 +1733,7 @@
         <c:noMultiLvlLbl val="0"/>
       </c:catAx>
       <c:valAx>
-        <c:axId val="2047536232"/>
+        <c:axId val="2057825016"/>
         <c:scaling>
           <c:orientation val="minMax"/>
         </c:scaling>
@@ -1744,7 +1744,7 @@
         <c:majorTickMark val="out"/>
         <c:minorTickMark val="none"/>
         <c:tickLblPos val="nextTo"/>
-        <c:crossAx val="2047533256"/>
+        <c:crossAx val="2057843736"/>
         <c:crosses val="autoZero"/>
         <c:crossBetween val="between"/>
       </c:valAx>
@@ -1854,11 +1854,11 @@
           <c:showBubbleSize val="0"/>
         </c:dLbls>
         <c:gapWidth val="150"/>
-        <c:axId val="2047569416"/>
-        <c:axId val="2047572392"/>
+        <c:axId val="2047939960"/>
+        <c:axId val="2047942936"/>
       </c:barChart>
       <c:catAx>
-        <c:axId val="2047569416"/>
+        <c:axId val="2047939960"/>
         <c:scaling>
           <c:orientation val="minMax"/>
         </c:scaling>
@@ -1867,7 +1867,7 @@
         <c:majorTickMark val="out"/>
         <c:minorTickMark val="none"/>
         <c:tickLblPos val="nextTo"/>
-        <c:crossAx val="2047572392"/>
+        <c:crossAx val="2047942936"/>
         <c:crosses val="autoZero"/>
         <c:auto val="1"/>
         <c:lblAlgn val="ctr"/>
@@ -1875,7 +1875,7 @@
         <c:noMultiLvlLbl val="0"/>
       </c:catAx>
       <c:valAx>
-        <c:axId val="2047572392"/>
+        <c:axId val="2047942936"/>
         <c:scaling>
           <c:orientation val="minMax"/>
         </c:scaling>
@@ -1886,7 +1886,7 @@
         <c:majorTickMark val="out"/>
         <c:minorTickMark val="none"/>
         <c:tickLblPos val="nextTo"/>
-        <c:crossAx val="2047569416"/>
+        <c:crossAx val="2047939960"/>
         <c:crosses val="autoZero"/>
         <c:crossBetween val="between"/>
       </c:valAx>
@@ -2054,11 +2054,11 @@
           <c:showBubbleSize val="0"/>
         </c:dLbls>
         <c:gapWidth val="150"/>
-        <c:axId val="2047637240"/>
-        <c:axId val="2047640216"/>
+        <c:axId val="2047878648"/>
+        <c:axId val="2047881624"/>
       </c:barChart>
       <c:catAx>
-        <c:axId val="2047637240"/>
+        <c:axId val="2047878648"/>
         <c:scaling>
           <c:orientation val="minMax"/>
         </c:scaling>
@@ -2067,7 +2067,7 @@
         <c:majorTickMark val="out"/>
         <c:minorTickMark val="none"/>
         <c:tickLblPos val="nextTo"/>
-        <c:crossAx val="2047640216"/>
+        <c:crossAx val="2047881624"/>
         <c:crosses val="autoZero"/>
         <c:auto val="1"/>
         <c:lblAlgn val="ctr"/>
@@ -2075,7 +2075,7 @@
         <c:noMultiLvlLbl val="0"/>
       </c:catAx>
       <c:valAx>
-        <c:axId val="2047640216"/>
+        <c:axId val="2047881624"/>
         <c:scaling>
           <c:orientation val="minMax"/>
         </c:scaling>
@@ -2086,7 +2086,7 @@
         <c:majorTickMark val="out"/>
         <c:minorTickMark val="none"/>
         <c:tickLblPos val="nextTo"/>
-        <c:crossAx val="2047637240"/>
+        <c:crossAx val="2047878648"/>
         <c:crosses val="autoZero"/>
         <c:crossBetween val="between"/>
       </c:valAx>
@@ -2254,11 +2254,11 @@
           <c:showBubbleSize val="0"/>
         </c:dLbls>
         <c:gapWidth val="150"/>
-        <c:axId val="2047678408"/>
-        <c:axId val="2047681384"/>
+        <c:axId val="2047921592"/>
+        <c:axId val="2051884392"/>
       </c:barChart>
       <c:catAx>
-        <c:axId val="2047678408"/>
+        <c:axId val="2047921592"/>
         <c:scaling>
           <c:orientation val="minMax"/>
         </c:scaling>
@@ -2267,7 +2267,7 @@
         <c:majorTickMark val="out"/>
         <c:minorTickMark val="none"/>
         <c:tickLblPos val="nextTo"/>
-        <c:crossAx val="2047681384"/>
+        <c:crossAx val="2051884392"/>
         <c:crosses val="autoZero"/>
         <c:auto val="1"/>
         <c:lblAlgn val="ctr"/>
@@ -2275,7 +2275,7 @@
         <c:noMultiLvlLbl val="0"/>
       </c:catAx>
       <c:valAx>
-        <c:axId val="2047681384"/>
+        <c:axId val="2051884392"/>
         <c:scaling>
           <c:orientation val="minMax"/>
         </c:scaling>
@@ -2286,7 +2286,7 @@
         <c:majorTickMark val="out"/>
         <c:minorTickMark val="none"/>
         <c:tickLblPos val="nextTo"/>
-        <c:crossAx val="2047678408"/>
+        <c:crossAx val="2047921592"/>
         <c:crosses val="autoZero"/>
         <c:crossBetween val="between"/>
       </c:valAx>
@@ -2597,7 +2597,7 @@
           <a:p>
             <a:fld id="{76A98DAD-5796-154F-9D08-20EF7FFE737C}" type="datetimeFigureOut">
               <a:rPr lang="en-US" smtClean="0"/>
-              <a:t>9/20/12</a:t>
+              <a:t>9/21/12</a:t>
             </a:fld>
             <a:endParaRPr lang="en-US"/>
           </a:p>
@@ -2790,7 +2790,7 @@
           <a:p>
             <a:fld id="{76A98DAD-5796-154F-9D08-20EF7FFE737C}" type="datetimeFigureOut">
               <a:rPr lang="en-US" smtClean="0"/>
-              <a:t>9/20/12</a:t>
+              <a:t>9/21/12</a:t>
             </a:fld>
             <a:endParaRPr lang="en-US"/>
           </a:p>
@@ -2975,7 +2975,7 @@
           <a:p>
             <a:fld id="{76A98DAD-5796-154F-9D08-20EF7FFE737C}" type="datetimeFigureOut">
               <a:rPr lang="en-US" smtClean="0"/>
-              <a:t>9/20/12</a:t>
+              <a:t>9/21/12</a:t>
             </a:fld>
             <a:endParaRPr lang="en-US"/>
           </a:p>
@@ -3238,7 +3238,7 @@
           <a:p>
             <a:fld id="{76A98DAD-5796-154F-9D08-20EF7FFE737C}" type="datetimeFigureOut">
               <a:rPr lang="en-US" smtClean="0"/>
-              <a:t>9/20/12</a:t>
+              <a:t>9/21/12</a:t>
             </a:fld>
             <a:endParaRPr lang="en-US"/>
           </a:p>
@@ -3654,7 +3654,7 @@
           <a:p>
             <a:fld id="{76A98DAD-5796-154F-9D08-20EF7FFE737C}" type="datetimeFigureOut">
               <a:rPr lang="en-US" smtClean="0"/>
-              <a:t>9/20/12</a:t>
+              <a:t>9/21/12</a:t>
             </a:fld>
             <a:endParaRPr lang="en-US"/>
           </a:p>
@@ -3896,7 +3896,7 @@
           <a:p>
             <a:fld id="{76A98DAD-5796-154F-9D08-20EF7FFE737C}" type="datetimeFigureOut">
               <a:rPr lang="en-US" smtClean="0"/>
-              <a:t>9/20/12</a:t>
+              <a:t>9/21/12</a:t>
             </a:fld>
             <a:endParaRPr lang="en-US"/>
           </a:p>
@@ -4132,7 +4132,7 @@
           <a:p>
             <a:fld id="{76A98DAD-5796-154F-9D08-20EF7FFE737C}" type="datetimeFigureOut">
               <a:rPr lang="en-US" smtClean="0"/>
-              <a:t>9/20/12</a:t>
+              <a:t>9/21/12</a:t>
             </a:fld>
             <a:endParaRPr lang="en-US"/>
           </a:p>
@@ -4327,7 +4327,7 @@
           <a:p>
             <a:fld id="{76A98DAD-5796-154F-9D08-20EF7FFE737C}" type="datetimeFigureOut">
               <a:rPr lang="en-US" smtClean="0"/>
-              <a:t>9/20/12</a:t>
+              <a:t>9/21/12</a:t>
             </a:fld>
             <a:endParaRPr lang="en-US"/>
           </a:p>
@@ -4425,7 +4425,7 @@
           <a:p>
             <a:fld id="{76A98DAD-5796-154F-9D08-20EF7FFE737C}" type="datetimeFigureOut">
               <a:rPr lang="en-US" smtClean="0"/>
-              <a:t>9/20/12</a:t>
+              <a:t>9/21/12</a:t>
             </a:fld>
             <a:endParaRPr lang="en-US"/>
           </a:p>
@@ -4561,7 +4561,7 @@
           <a:p>
             <a:fld id="{76A98DAD-5796-154F-9D08-20EF7FFE737C}" type="datetimeFigureOut">
               <a:rPr lang="en-US" smtClean="0"/>
-              <a:t>9/20/12</a:t>
+              <a:t>9/21/12</a:t>
             </a:fld>
             <a:endParaRPr lang="en-US"/>
           </a:p>
@@ -5080,7 +5080,7 @@
           <a:p>
             <a:fld id="{76A98DAD-5796-154F-9D08-20EF7FFE737C}" type="datetimeFigureOut">
               <a:rPr lang="en-US" smtClean="0"/>
-              <a:t>9/20/12</a:t>
+              <a:t>9/21/12</a:t>
             </a:fld>
             <a:endParaRPr lang="en-US"/>
           </a:p>
@@ -5341,7 +5341,7 @@
           <a:p>
             <a:fld id="{76A98DAD-5796-154F-9D08-20EF7FFE737C}" type="datetimeFigureOut">
               <a:rPr lang="en-US" smtClean="0"/>
-              <a:t>9/20/12</a:t>
+              <a:t>9/21/12</a:t>
             </a:fld>
             <a:endParaRPr lang="en-US"/>
           </a:p>
@@ -7462,22 +7462,14 @@
             <a:pPr lvl="1"/>
             <a:r>
               <a:rPr lang="en-US" dirty="0" smtClean="0"/>
-              <a:t>k</a:t>
-            </a:r>
+              <a:t>k: 76</a:t>
+            </a:r>
+          </a:p>
+          <a:p>
+            <a:pPr lvl="1"/>
             <a:r>
               <a:rPr lang="en-US" dirty="0" smtClean="0"/>
-              <a:t>: 76</a:t>
-            </a:r>
-          </a:p>
-          <a:p>
-            <a:pPr lvl="1"/>
-            <a:r>
-              <a:rPr lang="en-US" dirty="0" smtClean="0"/>
-              <a:t># nodes</a:t>
-            </a:r>
-            <a:r>
-              <a:rPr lang="en-US" dirty="0" smtClean="0"/>
-              <a:t>: 141</a:t>
+              <a:t># nodes: 141</a:t>
             </a:r>
           </a:p>
           <a:p>
@@ -7517,22 +7509,14 @@
             <a:pPr lvl="1"/>
             <a:r>
               <a:rPr lang="en-US" dirty="0" smtClean="0"/>
-              <a:t>k</a:t>
-            </a:r>
+              <a:t>k: 50</a:t>
+            </a:r>
+          </a:p>
+          <a:p>
+            <a:pPr lvl="1"/>
             <a:r>
               <a:rPr lang="en-US" dirty="0" smtClean="0"/>
-              <a:t>: 50</a:t>
-            </a:r>
-          </a:p>
-          <a:p>
-            <a:pPr lvl="1"/>
-            <a:r>
-              <a:rPr lang="en-US" dirty="0" smtClean="0"/>
-              <a:t># nodes</a:t>
-            </a:r>
-            <a:r>
-              <a:rPr lang="en-US" dirty="0" smtClean="0"/>
-              <a:t>: 64</a:t>
+              <a:t># nodes: 64</a:t>
             </a:r>
           </a:p>
           <a:p>
@@ -8855,8 +8839,12 @@
               <a:t>Implement k-dense in </a:t>
             </a:r>
             <a:r>
+              <a:rPr lang="en-US" dirty="0" err="1"/>
+              <a:t>i</a:t>
+            </a:r>
+            <a:r>
               <a:rPr lang="en-US" dirty="0" err="1" smtClean="0"/>
-              <a:t>IGraph</a:t>
+              <a:t>Graph</a:t>
             </a:r>
             <a:endParaRPr lang="en-US" dirty="0" smtClean="0"/>
           </a:p>
@@ -9187,7 +9175,23 @@
             </a:r>
             <a:r>
               <a:rPr lang="en-US" sz="2400" dirty="0" smtClean="0"/>
-              <a:t>of a graph G is a maximal connected sub-graph of G in which all vertices have degree at least k - 1</a:t>
+              <a:t>of a graph G is </a:t>
+            </a:r>
+            <a:r>
+              <a:rPr lang="en-US" sz="2400" dirty="0" smtClean="0"/>
+              <a:t>a set of </a:t>
+            </a:r>
+            <a:r>
+              <a:rPr lang="en-US" sz="2400" dirty="0" smtClean="0"/>
+              <a:t>maximal connected sub-</a:t>
+            </a:r>
+            <a:r>
+              <a:rPr lang="en-US" sz="2400" dirty="0" smtClean="0"/>
+              <a:t>graphs of </a:t>
+            </a:r>
+            <a:r>
+              <a:rPr lang="en-US" sz="2400" dirty="0" smtClean="0"/>
+              <a:t>G in which all vertices have degree at least k - 1</a:t>
             </a:r>
           </a:p>
           <a:p>
@@ -9498,7 +9502,23 @@
           <a:p>
             <a:r>
               <a:rPr lang="en-US" sz="2400" dirty="0" smtClean="0"/>
-              <a:t>A k-dense of a graph G is a maximal connected sub-graph of G where each pair of adjacent nodes have at least (k - 2) </a:t>
+              <a:t>A k-dense of a graph G is a </a:t>
+            </a:r>
+            <a:r>
+              <a:rPr lang="en-US" sz="2400" dirty="0" smtClean="0"/>
+              <a:t>set of maximal </a:t>
+            </a:r>
+            <a:r>
+              <a:rPr lang="en-US" sz="2400" dirty="0" smtClean="0"/>
+              <a:t>connected sub-</a:t>
+            </a:r>
+            <a:r>
+              <a:rPr lang="en-US" sz="2400" dirty="0" smtClean="0"/>
+              <a:t>graphs </a:t>
+            </a:r>
+            <a:r>
+              <a:rPr lang="en-US" sz="2400" dirty="0" smtClean="0"/>
+              <a:t>of G where each pair of adjacent nodes have at least (k - 2) </a:t>
             </a:r>
             <a:r>
               <a:rPr lang="en-US" sz="2400" dirty="0"/>

</xml_diff>

<commit_message>
rimossa parole massimale da slide 3 e 4
</commit_message>
<xml_diff>
--- a/presentation/kcore-kdense.pptx
+++ b/presentation/kcore-kdense.pptx
@@ -9179,11 +9179,15 @@
             </a:r>
             <a:r>
               <a:rPr lang="en-US" sz="2400" dirty="0" smtClean="0"/>
-              <a:t>a set of </a:t>
+              <a:t>a set </a:t>
+            </a:r>
+            <a:r>
+              <a:rPr lang="en-US" sz="2400" smtClean="0"/>
+              <a:t>of connected </a:t>
             </a:r>
             <a:r>
               <a:rPr lang="en-US" sz="2400" dirty="0" smtClean="0"/>
-              <a:t>maximal connected sub-</a:t>
+              <a:t>sub-</a:t>
             </a:r>
             <a:r>
               <a:rPr lang="en-US" sz="2400" dirty="0" smtClean="0"/>
@@ -9506,11 +9510,11 @@
             </a:r>
             <a:r>
               <a:rPr lang="en-US" sz="2400" dirty="0" smtClean="0"/>
-              <a:t>set of maximal </a:t>
+              <a:t>set of connected </a:t>
             </a:r>
             <a:r>
               <a:rPr lang="en-US" sz="2400" dirty="0" smtClean="0"/>
-              <a:t>connected sub-</a:t>
+              <a:t>sub-</a:t>
             </a:r>
             <a:r>
               <a:rPr lang="en-US" sz="2400" dirty="0" smtClean="0"/>

</xml_diff>